<commit_message>
Review review edits to single-role PPT
Removed mention of portfolios
</commit_message>
<xml_diff>
--- a/toolkit/reviewing-resumes/sme-training-resume-review-multirole.pptx
+++ b/toolkit/reviewing-resumes/sme-training-resume-review-multirole.pptx
@@ -1,6 +1,6 @@
 
 <file path=ppt/presentation.xml><?xml version="1.0" encoding="utf-8"?>
-<p:presentation xmlns:a="http://schemas.openxmlformats.org/drawingml/2006/main" xmlns:r="http://schemas.openxmlformats.org/officeDocument/2006/relationships" xmlns:p="http://schemas.openxmlformats.org/presentationml/2006/main" showSpecialPlsOnTitleSld="0" strictFirstAndLastChars="0" embedTrueTypeFonts="1" saveSubsetFonts="1" autoCompressPictures="0">
+<p:presentation xmlns:a="http://schemas.openxmlformats.org/drawingml/2006/main" xmlns:r="http://schemas.openxmlformats.org/officeDocument/2006/relationships" xmlns:p="http://schemas.openxmlformats.org/presentationml/2006/main" showSpecialPlsOnTitleSld="0" strictFirstAndLastChars="0" embedTrueTypeFonts="1" autoCompressPictures="0">
   <p:sldMasterIdLst>
     <p:sldMasterId id="2147483666" r:id="rId1"/>
   </p:sldMasterIdLst>
@@ -50,49 +50,49 @@
   <p:notesSz cx="6881813" cy="9296400"/>
   <p:embeddedFontLst>
     <p:embeddedFont>
-      <p:font typeface="Cambria" panose="02040503050406030204" pitchFamily="18" charset="0"/>
+      <p:font typeface="Avenir" panose="02000503020000020003" pitchFamily="2" charset="0"/>
       <p:regular r:id="rId38"/>
-      <p:bold r:id="rId39"/>
-      <p:italic r:id="rId40"/>
-      <p:boldItalic r:id="rId41"/>
+      <p:italic r:id="rId39"/>
     </p:embeddedFont>
     <p:embeddedFont>
-      <p:font typeface="Rockwell" panose="02060603020205020403" pitchFamily="18" charset="0"/>
-      <p:regular r:id="rId42"/>
-      <p:bold r:id="rId43"/>
-      <p:italic r:id="rId44"/>
-      <p:boldItalic r:id="rId45"/>
+      <p:font typeface="Cambria" panose="02040503050406030204" pitchFamily="18" charset="0"/>
+      <p:regular r:id="rId40"/>
+      <p:bold r:id="rId41"/>
+      <p:italic r:id="rId42"/>
+      <p:boldItalic r:id="rId43"/>
+    </p:embeddedFont>
+    <p:embeddedFont>
+      <p:font typeface="Merriweather" pitchFamily="2" charset="77"/>
+      <p:regular r:id="rId44"/>
+      <p:bold r:id="rId45"/>
+      <p:italic r:id="rId46"/>
+      <p:boldItalic r:id="rId47"/>
+    </p:embeddedFont>
+    <p:embeddedFont>
+      <p:font typeface="Merriweather Sans" pitchFamily="2" charset="77"/>
+      <p:regular r:id="rId48"/>
+      <p:bold r:id="rId49"/>
+      <p:italic r:id="rId50"/>
+      <p:boldItalic r:id="rId51"/>
+    </p:embeddedFont>
+    <p:embeddedFont>
+      <p:font typeface="Rockwell" panose="02060603020205020403" pitchFamily="18" charset="77"/>
+      <p:regular r:id="rId52"/>
+      <p:bold r:id="rId53"/>
+      <p:italic r:id="rId54"/>
+      <p:boldItalic r:id="rId55"/>
     </p:embeddedFont>
     <p:embeddedFont>
       <p:font typeface="Source Sans Pro" panose="020B0503030403020204" pitchFamily="34" charset="0"/>
-      <p:regular r:id="rId46"/>
-      <p:bold r:id="rId47"/>
-      <p:italic r:id="rId48"/>
-      <p:boldItalic r:id="rId49"/>
-    </p:embeddedFont>
-    <p:embeddedFont>
-      <p:font typeface="Merriweather" panose="00000500000000000000" pitchFamily="2" charset="0"/>
-      <p:regular r:id="rId50"/>
-      <p:bold r:id="rId51"/>
-      <p:italic r:id="rId52"/>
-      <p:boldItalic r:id="rId53"/>
-    </p:embeddedFont>
-    <p:embeddedFont>
-      <p:font typeface="Source Sans Pro SemiBold" panose="020B0603030403020204" pitchFamily="34" charset="0"/>
-      <p:bold r:id="rId54"/>
-      <p:boldItalic r:id="rId55"/>
-    </p:embeddedFont>
-    <p:embeddedFont>
-      <p:font typeface="Merriweather Sans"/>
       <p:regular r:id="rId56"/>
       <p:bold r:id="rId57"/>
       <p:italic r:id="rId58"/>
       <p:boldItalic r:id="rId59"/>
     </p:embeddedFont>
     <p:embeddedFont>
-      <p:font typeface="Avenir"/>
-      <p:regular r:id="rId60"/>
-      <p:italic r:id="rId61"/>
+      <p:font typeface="Source Sans Pro SemiBold" panose="020B0603030403020204" pitchFamily="34" charset="0"/>
+      <p:bold r:id="rId60"/>
+      <p:boldItalic r:id="rId61"/>
     </p:embeddedFont>
   </p:embeddedFontLst>
   <p:defaultTextStyle>
@@ -452,7 +452,7 @@
           <a:p>
             <a:fld id="{5F1244B9-655E-9143-8F11-143B7EBD7CDE}" type="datetimeFigureOut">
               <a:rPr lang="en-US" smtClean="0"/>
-              <a:t>11/20/2019</a:t>
+              <a:t>6/19/20</a:t>
             </a:fld>
             <a:endParaRPr lang="en-US"/>
           </a:p>
@@ -7688,7 +7688,7 @@
             <a:fld id="{42D41BD8-F932-40AA-8DAC-647898DB09A3}" type="datetime1">
               <a:rPr lang="en-US" smtClean="0"/>
               <a:pPr/>
-              <a:t>11/20/2019</a:t>
+              <a:t>6/19/20</a:t>
             </a:fld>
             <a:endParaRPr lang="en-US" dirty="0"/>
           </a:p>
@@ -10408,10 +10408,6 @@
               <a:rPr lang="en-US" b="1" dirty="0"/>
               <a:t>Move Forward</a:t>
             </a:r>
-            <a:r>
-              <a:rPr lang="en-US" dirty="0"/>
-              <a:t/>
-            </a:r>
             <a:br>
               <a:rPr lang="en-US" dirty="0"/>
             </a:br>
@@ -10433,10 +10429,6 @@
             <a:r>
               <a:rPr lang="en-US" b="1" dirty="0"/>
               <a:t>Does Not Move Forward</a:t>
-            </a:r>
-            <a:r>
-              <a:rPr lang="en-US" dirty="0"/>
-              <a:t/>
             </a:r>
             <a:br>
               <a:rPr lang="en-US" dirty="0"/>
@@ -11448,11 +11440,7 @@
             </a:pPr>
             <a:r>
               <a:rPr lang="en-US" dirty="0"/>
-              <a:t>Copy of competencies and proficiency levels doc that the team created out of Job Analysis </a:t>
-            </a:r>
-            <a:r>
-              <a:rPr lang="en-US" dirty="0" smtClean="0"/>
-              <a:t>Workshop</a:t>
+              <a:t>Copy of competencies and proficiency levels doc that the team created out of Job Analysis Workshop</a:t>
             </a:r>
           </a:p>
           <a:p>
@@ -11462,13 +11450,8 @@
             </a:pPr>
             <a:r>
               <a:rPr lang="en-US" dirty="0"/>
-              <a:t>Decide if your resume review with use 1-4 sentences or a different method like a competency checklist and reflect that in the </a:t>
+              <a:t>Decide if your resume review with use 1-4 sentences or a different method like a competency checklist and reflect that in the slides</a:t>
             </a:r>
-            <a:r>
-              <a:rPr lang="en-US" dirty="0" smtClean="0"/>
-              <a:t>slides</a:t>
-            </a:r>
-            <a:endParaRPr lang="en-US" dirty="0"/>
           </a:p>
           <a:p>
             <a:pPr marL="742967" indent="-571500">
@@ -12123,7 +12106,7 @@
               <a:buNone/>
             </a:pPr>
             <a:r>
-              <a:rPr lang="en-US" sz="2800" dirty="0" smtClean="0"/>
+              <a:rPr lang="en-US" sz="2800" dirty="0"/>
               <a:t>— National Bureau of Economic Research </a:t>
             </a:r>
             <a:endParaRPr sz="2800" dirty="0"/>
@@ -12452,57 +12435,33 @@
                   <a:srgbClr val="046B99"/>
                 </a:solidFill>
               </a:rPr>
-              <a:t>1</a:t>
-            </a:r>
-            <a:r>
-              <a:rPr lang="en-US" dirty="0" smtClean="0">
-                <a:solidFill>
-                  <a:srgbClr val="046B99"/>
-                </a:solidFill>
-              </a:rPr>
-              <a:t>/</a:t>
-            </a:r>
-            <a:r>
-              <a:rPr lang="en-US" dirty="0" smtClean="0"/>
-              <a:t> </a:t>
+              <a:t>1/</a:t>
             </a:r>
             <a:r>
               <a:rPr lang="en-US" dirty="0"/>
-              <a:t>Don’t look up candidates</a:t>
+              <a:t> Don’t look up candidates</a:t>
             </a:r>
             <a:endParaRPr dirty="0"/>
           </a:p>
           <a:p>
             <a:pPr lvl="0"/>
             <a:r>
-              <a:rPr lang="en-US" dirty="0" smtClean="0">
-                <a:solidFill>
-                  <a:srgbClr val="046B99"/>
-                </a:solidFill>
-              </a:rPr>
-              <a:t>2</a:t>
-            </a:r>
-            <a:r>
               <a:rPr lang="en-US" dirty="0">
                 <a:solidFill>
                   <a:srgbClr val="046B99"/>
                 </a:solidFill>
               </a:rPr>
-              <a:t>/</a:t>
+              <a:t>2/</a:t>
             </a:r>
             <a:r>
               <a:rPr lang="en-US" dirty="0"/>
-              <a:t> Question your </a:t>
-            </a:r>
-            <a:r>
-              <a:rPr lang="en-US" dirty="0"/>
-              <a:t>assumptions</a:t>
+              <a:t> Question your assumptions</a:t>
             </a:r>
             <a:br>
               <a:rPr lang="en-US" dirty="0"/>
             </a:br>
             <a:r>
-              <a:rPr lang="en-US" dirty="0" smtClean="0">
+              <a:rPr lang="en-US" dirty="0">
                 <a:solidFill>
                   <a:srgbClr val="046B99"/>
                 </a:solidFill>
@@ -12510,7 +12469,7 @@
               <a:t>3/</a:t>
             </a:r>
             <a:r>
-              <a:rPr lang="en-US" dirty="0" smtClean="0"/>
+              <a:rPr lang="en-US" dirty="0"/>
               <a:t> Use competencies/proficiency levels</a:t>
             </a:r>
             <a:endParaRPr dirty="0"/>
@@ -12531,27 +12490,11 @@
                   <a:srgbClr val="046B99"/>
                 </a:solidFill>
               </a:rPr>
-              <a:t>4</a:t>
-            </a:r>
-            <a:r>
-              <a:rPr lang="en-US" dirty="0" smtClean="0">
-                <a:solidFill>
-                  <a:srgbClr val="046B99"/>
-                </a:solidFill>
-              </a:rPr>
-              <a:t>/</a:t>
-            </a:r>
-            <a:r>
-              <a:rPr lang="en-US" dirty="0" smtClean="0"/>
-              <a:t> </a:t>
+              <a:t>4/</a:t>
             </a:r>
             <a:r>
               <a:rPr lang="en-US" dirty="0"/>
-              <a:t>Look at how you describe </a:t>
-            </a:r>
-            <a:r>
-              <a:rPr lang="en-US" dirty="0" smtClean="0"/>
-              <a:t>people</a:t>
+              <a:t> Look at how you describe people</a:t>
             </a:r>
             <a:endParaRPr dirty="0"/>
           </a:p>
@@ -12674,23 +12617,11 @@
                   <a:srgbClr val="1C304A"/>
                 </a:solidFill>
               </a:rPr>
-              <a:t>1</a:t>
-            </a:r>
-            <a:r>
-              <a:rPr lang="en-US" dirty="0" smtClean="0">
-                <a:solidFill>
-                  <a:srgbClr val="1C304A"/>
-                </a:solidFill>
-              </a:rPr>
-              <a:t>/</a:t>
-            </a:r>
-            <a:r>
-              <a:rPr lang="en-US" dirty="0" smtClean="0"/>
-              <a:t> </a:t>
+              <a:t>1/</a:t>
             </a:r>
             <a:r>
               <a:rPr lang="en-US" dirty="0"/>
-              <a:t>Don’t look up candidates</a:t>
+              <a:t> Don’t look up candidates</a:t>
             </a:r>
             <a:endParaRPr dirty="0"/>
           </a:p>
@@ -12748,11 +12679,7 @@
             </a:pPr>
             <a:r>
               <a:rPr lang="en-US" dirty="0"/>
-              <a:t>Don’t search for candidates online. Instead, use the application materials </a:t>
-            </a:r>
-            <a:r>
-              <a:rPr lang="en-US" dirty="0" smtClean="0"/>
-              <a:t>provided. </a:t>
+              <a:t>Don’t search for candidates online. Instead, use the application materials provided. </a:t>
             </a:r>
             <a:endParaRPr dirty="0"/>
           </a:p>
@@ -12875,23 +12802,11 @@
                   <a:srgbClr val="1C304A"/>
                 </a:solidFill>
               </a:rPr>
-              <a:t>2</a:t>
-            </a:r>
-            <a:r>
-              <a:rPr lang="en-US" dirty="0" smtClean="0">
-                <a:solidFill>
-                  <a:srgbClr val="1C304A"/>
-                </a:solidFill>
-              </a:rPr>
-              <a:t>/</a:t>
-            </a:r>
-            <a:r>
-              <a:rPr lang="en-US" dirty="0" smtClean="0"/>
-              <a:t> </a:t>
+              <a:t>2/</a:t>
             </a:r>
             <a:r>
               <a:rPr lang="en-US" dirty="0"/>
-              <a:t>Question your assumptions</a:t>
+              <a:t> Question your assumptions</a:t>
             </a:r>
             <a:endParaRPr dirty="0"/>
           </a:p>
@@ -13180,27 +13095,11 @@
                   <a:srgbClr val="1C304A"/>
                 </a:solidFill>
               </a:rPr>
-              <a:t>3</a:t>
-            </a:r>
-            <a:r>
-              <a:rPr lang="en-US" dirty="0" smtClean="0">
-                <a:solidFill>
-                  <a:srgbClr val="1C304A"/>
-                </a:solidFill>
-              </a:rPr>
-              <a:t>/</a:t>
-            </a:r>
-            <a:r>
-              <a:rPr lang="en-US" dirty="0" smtClean="0"/>
-              <a:t> </a:t>
+              <a:t>3/</a:t>
             </a:r>
             <a:r>
               <a:rPr lang="en-US" dirty="0"/>
-              <a:t>Use the </a:t>
-            </a:r>
-            <a:r>
-              <a:rPr lang="en-US" dirty="0" smtClean="0"/>
-              <a:t>competencies and proficiency levels</a:t>
+              <a:t> Use the competencies and proficiency levels</a:t>
             </a:r>
             <a:endParaRPr dirty="0"/>
           </a:p>
@@ -13266,11 +13165,7 @@
             </a:pPr>
             <a:r>
               <a:rPr lang="en-US" dirty="0"/>
-              <a:t>Make sure to double check your reviews against </a:t>
-            </a:r>
-            <a:r>
-              <a:rPr lang="en-US" dirty="0" smtClean="0"/>
-              <a:t>the pre-established qualifications.</a:t>
+              <a:t>Make sure to double check your reviews against the pre-established qualifications.</a:t>
             </a:r>
             <a:endParaRPr dirty="0"/>
           </a:p>
@@ -13395,7 +13290,7 @@
               <a:buNone/>
             </a:pPr>
             <a:r>
-              <a:rPr lang="en-US" dirty="0" smtClean="0">
+              <a:rPr lang="en-US" dirty="0">
                 <a:solidFill>
                   <a:srgbClr val="1C304A"/>
                 </a:solidFill>
@@ -13403,12 +13298,8 @@
               <a:t>3/</a:t>
             </a:r>
             <a:r>
-              <a:rPr lang="en-US" dirty="0" smtClean="0"/>
-              <a:t> </a:t>
-            </a:r>
-            <a:r>
               <a:rPr lang="en-US" dirty="0"/>
-              <a:t>Look at how you describe people</a:t>
+              <a:t> Look at how you describe people</a:t>
             </a:r>
             <a:endParaRPr dirty="0"/>
           </a:p>
@@ -13579,10 +13470,6 @@
             <a:br>
               <a:rPr lang="en-US" b="0" dirty="0"/>
             </a:br>
-            <a:r>
-              <a:rPr lang="en-US" b="0" dirty="0"/>
-              <a:t/>
-            </a:r>
             <a:br>
               <a:rPr lang="en-US" b="0" dirty="0"/>
             </a:br>

</xml_diff>